<commit_message>
Web site as part of project
</commit_message>
<xml_diff>
--- a/Docs/UberMundo™.pptx
+++ b/Docs/UberMundo™.pptx
@@ -269,7 +269,7 @@
           <a:p>
             <a:fld id="{7FDEBF38-21DE-4F6F-B415-B3F9C37421DA}" type="datetimeFigureOut">
               <a:rPr lang="en-US" smtClean="0"/>
-              <a:t>5/21/2021</a:t>
+              <a:t>5/9/2023</a:t>
             </a:fld>
             <a:endParaRPr lang="en-US"/>
           </a:p>
@@ -467,7 +467,7 @@
           <a:p>
             <a:fld id="{7FDEBF38-21DE-4F6F-B415-B3F9C37421DA}" type="datetimeFigureOut">
               <a:rPr lang="en-US" smtClean="0"/>
-              <a:t>5/21/2021</a:t>
+              <a:t>5/9/2023</a:t>
             </a:fld>
             <a:endParaRPr lang="en-US"/>
           </a:p>
@@ -675,7 +675,7 @@
           <a:p>
             <a:fld id="{7FDEBF38-21DE-4F6F-B415-B3F9C37421DA}" type="datetimeFigureOut">
               <a:rPr lang="en-US" smtClean="0"/>
-              <a:t>5/21/2021</a:t>
+              <a:t>5/9/2023</a:t>
             </a:fld>
             <a:endParaRPr lang="en-US"/>
           </a:p>
@@ -873,7 +873,7 @@
           <a:p>
             <a:fld id="{7FDEBF38-21DE-4F6F-B415-B3F9C37421DA}" type="datetimeFigureOut">
               <a:rPr lang="en-US" smtClean="0"/>
-              <a:t>5/21/2021</a:t>
+              <a:t>5/9/2023</a:t>
             </a:fld>
             <a:endParaRPr lang="en-US"/>
           </a:p>
@@ -1148,7 +1148,7 @@
           <a:p>
             <a:fld id="{7FDEBF38-21DE-4F6F-B415-B3F9C37421DA}" type="datetimeFigureOut">
               <a:rPr lang="en-US" smtClean="0"/>
-              <a:t>5/21/2021</a:t>
+              <a:t>5/9/2023</a:t>
             </a:fld>
             <a:endParaRPr lang="en-US"/>
           </a:p>
@@ -1413,7 +1413,7 @@
           <a:p>
             <a:fld id="{7FDEBF38-21DE-4F6F-B415-B3F9C37421DA}" type="datetimeFigureOut">
               <a:rPr lang="en-US" smtClean="0"/>
-              <a:t>5/21/2021</a:t>
+              <a:t>5/9/2023</a:t>
             </a:fld>
             <a:endParaRPr lang="en-US"/>
           </a:p>
@@ -1825,7 +1825,7 @@
           <a:p>
             <a:fld id="{7FDEBF38-21DE-4F6F-B415-B3F9C37421DA}" type="datetimeFigureOut">
               <a:rPr lang="en-US" smtClean="0"/>
-              <a:t>5/21/2021</a:t>
+              <a:t>5/9/2023</a:t>
             </a:fld>
             <a:endParaRPr lang="en-US"/>
           </a:p>
@@ -1966,7 +1966,7 @@
           <a:p>
             <a:fld id="{7FDEBF38-21DE-4F6F-B415-B3F9C37421DA}" type="datetimeFigureOut">
               <a:rPr lang="en-US" smtClean="0"/>
-              <a:t>5/21/2021</a:t>
+              <a:t>5/9/2023</a:t>
             </a:fld>
             <a:endParaRPr lang="en-US"/>
           </a:p>
@@ -2079,7 +2079,7 @@
           <a:p>
             <a:fld id="{7FDEBF38-21DE-4F6F-B415-B3F9C37421DA}" type="datetimeFigureOut">
               <a:rPr lang="en-US" smtClean="0"/>
-              <a:t>5/21/2021</a:t>
+              <a:t>5/9/2023</a:t>
             </a:fld>
             <a:endParaRPr lang="en-US"/>
           </a:p>
@@ -2390,7 +2390,7 @@
           <a:p>
             <a:fld id="{7FDEBF38-21DE-4F6F-B415-B3F9C37421DA}" type="datetimeFigureOut">
               <a:rPr lang="en-US" smtClean="0"/>
-              <a:t>5/21/2021</a:t>
+              <a:t>5/9/2023</a:t>
             </a:fld>
             <a:endParaRPr lang="en-US"/>
           </a:p>
@@ -2678,7 +2678,7 @@
           <a:p>
             <a:fld id="{7FDEBF38-21DE-4F6F-B415-B3F9C37421DA}" type="datetimeFigureOut">
               <a:rPr lang="en-US" smtClean="0"/>
-              <a:t>5/21/2021</a:t>
+              <a:t>5/9/2023</a:t>
             </a:fld>
             <a:endParaRPr lang="en-US"/>
           </a:p>
@@ -2919,7 +2919,7 @@
           <a:p>
             <a:fld id="{7FDEBF38-21DE-4F6F-B415-B3F9C37421DA}" type="datetimeFigureOut">
               <a:rPr lang="en-US" smtClean="0"/>
-              <a:t>5/21/2021</a:t>
+              <a:t>5/9/2023</a:t>
             </a:fld>
             <a:endParaRPr lang="en-US"/>
           </a:p>
@@ -3514,15 +3514,7 @@
           <a:p>
             <a:r>
               <a:rPr lang="en-US" dirty="0"/>
-              <a:t>A player has a data set (world, chat. </a:t>
-            </a:r>
-            <a:r>
-              <a:rPr lang="en-US" dirty="0" err="1"/>
-              <a:t>Builtien</a:t>
-            </a:r>
-            <a:r>
-              <a:rPr lang="en-US" dirty="0"/>
-              <a:t> board etc.) they own.</a:t>
+              <a:t>A player has a data set (world, chat. Bulletin board etc.) they own.</a:t>
             </a:r>
           </a:p>
           <a:p>
@@ -3799,7 +3791,7 @@
           <a:p>
             <a:r>
               <a:rPr lang="en-US" dirty="0"/>
-              <a:t>No Central Server</a:t>
+              <a:t>Central Server</a:t>
             </a:r>
           </a:p>
           <a:p>
@@ -3916,8 +3908,19 @@
         </p:nvSpPr>
         <p:spPr/>
         <p:txBody>
-          <a:bodyPr/>
-          <a:lstStyle/>
+          <a:bodyPr>
+            <a:normAutofit lnSpcReduction="10000"/>
+          </a:bodyPr>
+          <a:lstStyle/>
+          <a:p>
+            <a:pPr marL="0" indent="0">
+              <a:buNone/>
+            </a:pPr>
+            <a:r>
+              <a:rPr lang="en-US" dirty="0"/>
+              <a:t>In Web of Trust…</a:t>
+            </a:r>
+          </a:p>
           <a:p>
             <a:r>
               <a:rPr lang="en-US" dirty="0"/>
@@ -3933,7 +3936,7 @@
           <a:p>
             <a:r>
               <a:rPr lang="en-US" dirty="0"/>
-              <a:t>If the Fred sends Bob a message it is sent directly between them. If either is offline the message waits on the sender’s computer until they are both online.</a:t>
+              <a:t>If Fred sends Bob a message it is sent directly between them. If either is offline the message waits on the sender’s computer until they are both online.</a:t>
             </a:r>
           </a:p>
           <a:p>

</xml_diff>